<commit_message>
Update the date for D4.1
</commit_message>
<xml_diff>
--- a/kickoff/WP4IntroToPO.pptx
+++ b/kickoff/WP4IntroToPO.pptx
@@ -263,7 +263,7 @@
           <a:p>
             <a:fld id="{38AEA946-BE12-485E-8CED-EB49F79C0D9F}" type="datetimeFigureOut">
               <a:rPr lang="de-CH" smtClean="0"/>
-              <a:t>02.03.16</a:t>
+              <a:t>03.03.16</a:t>
             </a:fld>
             <a:endParaRPr lang="de-CH"/>
           </a:p>
@@ -588,14 +588,14 @@
           </a:ln>
           <a:extLst>
             <a:ext uri="{909E8E84-426E-40dd-AFC4-6F175D3DCCD1}">
-              <a14:hiddenFill xmlns:a14="http://schemas.microsoft.com/office/drawing/2010/main" xmlns="">
+              <a14:hiddenFill xmlns="" xmlns:a14="http://schemas.microsoft.com/office/drawing/2010/main">
                 <a:solidFill>
                   <a:schemeClr val="accent1"/>
                 </a:solidFill>
               </a14:hiddenFill>
             </a:ext>
             <a:ext uri="{91240B29-F687-4f45-9708-019B960494DF}">
-              <a14:hiddenLine xmlns:a14="http://schemas.microsoft.com/office/drawing/2010/main" xmlns="" w="9525">
+              <a14:hiddenLine xmlns="" xmlns:a14="http://schemas.microsoft.com/office/drawing/2010/main" w="9525">
                 <a:solidFill>
                   <a:schemeClr val="tx1"/>
                 </a:solidFill>
@@ -1332,14 +1332,14 @@
           </a:ln>
           <a:extLst>
             <a:ext uri="{909E8E84-426E-40dd-AFC4-6F175D3DCCD1}">
-              <a14:hiddenFill xmlns:a14="http://schemas.microsoft.com/office/drawing/2010/main" xmlns="">
+              <a14:hiddenFill xmlns="" xmlns:a14="http://schemas.microsoft.com/office/drawing/2010/main">
                 <a:solidFill>
                   <a:schemeClr val="accent1"/>
                 </a:solidFill>
               </a14:hiddenFill>
             </a:ext>
             <a:ext uri="{91240B29-F687-4f45-9708-019B960494DF}">
-              <a14:hiddenLine xmlns:a14="http://schemas.microsoft.com/office/drawing/2010/main" xmlns="" w="9525">
+              <a14:hiddenLine xmlns="" xmlns:a14="http://schemas.microsoft.com/office/drawing/2010/main" w="9525">
                 <a:solidFill>
                   <a:schemeClr val="tx1"/>
                 </a:solidFill>
@@ -2866,14 +2866,14 @@
           </a:ln>
           <a:extLst>
             <a:ext uri="{909E8E84-426E-40dd-AFC4-6F175D3DCCD1}">
-              <a14:hiddenFill xmlns:a14="http://schemas.microsoft.com/office/drawing/2010/main" xmlns="">
+              <a14:hiddenFill xmlns="" xmlns:a14="http://schemas.microsoft.com/office/drawing/2010/main">
                 <a:solidFill>
                   <a:schemeClr val="accent1"/>
                 </a:solidFill>
               </a14:hiddenFill>
             </a:ext>
             <a:ext uri="{91240B29-F687-4f45-9708-019B960494DF}">
-              <a14:hiddenLine xmlns:a14="http://schemas.microsoft.com/office/drawing/2010/main" xmlns="" w="9525">
+              <a14:hiddenLine xmlns="" xmlns:a14="http://schemas.microsoft.com/office/drawing/2010/main" w="9525">
                 <a:solidFill>
                   <a:schemeClr val="tx1"/>
                 </a:solidFill>
@@ -3241,14 +3241,14 @@
           </a:ln>
           <a:extLst>
             <a:ext uri="{909E8E84-426E-40dd-AFC4-6F175D3DCCD1}">
-              <a14:hiddenFill xmlns:a14="http://schemas.microsoft.com/office/drawing/2010/main" xmlns="">
+              <a14:hiddenFill xmlns="" xmlns:a14="http://schemas.microsoft.com/office/drawing/2010/main">
                 <a:solidFill>
                   <a:schemeClr val="accent1"/>
                 </a:solidFill>
               </a14:hiddenFill>
             </a:ext>
             <a:ext uri="{91240B29-F687-4f45-9708-019B960494DF}">
-              <a14:hiddenLine xmlns:a14="http://schemas.microsoft.com/office/drawing/2010/main" xmlns="" w="9525">
+              <a14:hiddenLine xmlns="" xmlns:a14="http://schemas.microsoft.com/office/drawing/2010/main" w="9525">
                 <a:solidFill>
                   <a:schemeClr val="tx1"/>
                 </a:solidFill>
@@ -3612,14 +3612,14 @@
           </a:ln>
           <a:extLst>
             <a:ext uri="{909E8E84-426E-40dd-AFC4-6F175D3DCCD1}">
-              <a14:hiddenFill xmlns:a14="http://schemas.microsoft.com/office/drawing/2010/main" xmlns="">
+              <a14:hiddenFill xmlns="" xmlns:a14="http://schemas.microsoft.com/office/drawing/2010/main">
                 <a:solidFill>
                   <a:schemeClr val="accent1"/>
                 </a:solidFill>
               </a14:hiddenFill>
             </a:ext>
             <a:ext uri="{91240B29-F687-4f45-9708-019B960494DF}">
-              <a14:hiddenLine xmlns:a14="http://schemas.microsoft.com/office/drawing/2010/main" xmlns="" w="9525">
+              <a14:hiddenLine xmlns="" xmlns:a14="http://schemas.microsoft.com/office/drawing/2010/main" w="9525">
                 <a:solidFill>
                   <a:schemeClr val="tx1"/>
                 </a:solidFill>
@@ -4509,14 +4509,14 @@
           </a:ln>
           <a:extLst>
             <a:ext uri="{909E8E84-426E-40dd-AFC4-6F175D3DCCD1}">
-              <a14:hiddenFill xmlns:a14="http://schemas.microsoft.com/office/drawing/2010/main" xmlns="">
+              <a14:hiddenFill xmlns="" xmlns:a14="http://schemas.microsoft.com/office/drawing/2010/main">
                 <a:solidFill>
                   <a:schemeClr val="accent1"/>
                 </a:solidFill>
               </a14:hiddenFill>
             </a:ext>
             <a:ext uri="{91240B29-F687-4f45-9708-019B960494DF}">
-              <a14:hiddenLine xmlns:a14="http://schemas.microsoft.com/office/drawing/2010/main" xmlns="" w="9525">
+              <a14:hiddenLine xmlns="" xmlns:a14="http://schemas.microsoft.com/office/drawing/2010/main" w="9525">
                 <a:solidFill>
                   <a:schemeClr val="tx1"/>
                 </a:solidFill>
@@ -5860,11 +5860,7 @@
             <a:pPr lvl="1"/>
             <a:r>
               <a:rPr lang="en-GB" dirty="0" smtClean="0"/>
-              <a:t>Data management and </a:t>
-            </a:r>
-            <a:r>
-              <a:rPr lang="en-GB" dirty="0" smtClean="0"/>
-              <a:t>accessibility</a:t>
+              <a:t>Data management and accessibility</a:t>
             </a:r>
             <a:endParaRPr lang="en-GB" dirty="0"/>
           </a:p>
@@ -6090,7 +6086,6 @@
               <a:rPr lang="en-US" sz="2400" dirty="0"/>
               <a:t>B. Trammell: On Explicit In-Band Measurement</a:t>
             </a:r>
-            <a:endParaRPr lang="en-US" sz="2400" dirty="0"/>
           </a:p>
         </p:txBody>
       </p:sp>
@@ -6516,15 +6511,7 @@
                   <a:schemeClr val="tx1"/>
                 </a:solidFill>
               </a:rPr>
-              <a:t>And in addition: How will this data contribute to the project innovation impact</a:t>
-            </a:r>
-            <a:r>
-              <a:rPr lang="en-US" sz="2400" dirty="0" smtClean="0">
-                <a:solidFill>
-                  <a:schemeClr val="tx1"/>
-                </a:solidFill>
-              </a:rPr>
-              <a:t>?</a:t>
+              <a:t>And in addition: How will this data contribute to the project innovation impact?</a:t>
             </a:r>
           </a:p>
           <a:p>
@@ -6545,8 +6532,29 @@
                   <a:schemeClr val="tx1"/>
                 </a:solidFill>
               </a:rPr>
-              <a:t>Data Management Plan to be available by Month X</a:t>
-            </a:r>
+              <a:t>Data Management Plan to be available by </a:t>
+            </a:r>
+            <a:r>
+              <a:rPr lang="en-US" sz="2400" smtClean="0">
+                <a:solidFill>
+                  <a:schemeClr val="tx1"/>
+                </a:solidFill>
+              </a:rPr>
+              <a:t>Month </a:t>
+            </a:r>
+            <a:r>
+              <a:rPr lang="en-US" sz="2400" smtClean="0">
+                <a:solidFill>
+                  <a:schemeClr val="tx1"/>
+                </a:solidFill>
+              </a:rPr>
+              <a:t>4</a:t>
+            </a:r>
+            <a:endParaRPr lang="en-US" sz="2400" dirty="0" smtClean="0">
+              <a:solidFill>
+                <a:schemeClr val="tx1"/>
+              </a:solidFill>
+            </a:endParaRPr>
           </a:p>
           <a:p>
             <a:pPr lvl="1"/>
@@ -6615,11 +6623,6 @@
               </a:rPr>
               <a:t>)</a:t>
             </a:r>
-            <a:endParaRPr lang="en-US" sz="1800" dirty="0" smtClean="0">
-              <a:solidFill>
-                <a:schemeClr val="tx1"/>
-              </a:solidFill>
-            </a:endParaRPr>
           </a:p>
         </p:txBody>
       </p:sp>
@@ -6727,13 +6730,8 @@
           <a:p>
             <a:r>
               <a:rPr lang="en-GB" dirty="0" smtClean="0"/>
-              <a:t>Anyone can </a:t>
-            </a:r>
-            <a:r>
-              <a:rPr lang="en-GB" dirty="0" smtClean="0"/>
-              <a:t>query data in the MAMI observatory </a:t>
-            </a:r>
-            <a:endParaRPr lang="en-GB" dirty="0" smtClean="0"/>
+              <a:t>Anyone can query data in the MAMI observatory </a:t>
+            </a:r>
           </a:p>
           <a:p>
             <a:pPr lvl="1"/>
@@ -6751,11 +6749,7 @@
             </a:r>
             <a:r>
               <a:rPr lang="en-GB" dirty="0" smtClean="0"/>
-              <a:t>observatory are </a:t>
-            </a:r>
-            <a:r>
-              <a:rPr lang="en-GB" dirty="0" smtClean="0"/>
-              <a:t>"</a:t>
+              <a:t>observatory are "</a:t>
             </a:r>
             <a:r>
               <a:rPr lang="en-GB" dirty="0"/>
@@ -6816,39 +6810,7 @@
                   <a:schemeClr val="tx1"/>
                 </a:solidFill>
               </a:rPr>
-              <a:t>Anyone can (try to) combine </a:t>
-            </a:r>
-            <a:r>
-              <a:rPr lang="en-GB" dirty="0" smtClean="0">
-                <a:solidFill>
-                  <a:schemeClr val="tx1"/>
-                </a:solidFill>
-              </a:rPr>
-              <a:t>data </a:t>
-            </a:r>
-            <a:r>
-              <a:rPr lang="en-GB" dirty="0" smtClean="0">
-                <a:solidFill>
-                  <a:schemeClr val="tx1"/>
-                </a:solidFill>
-              </a:rPr>
-              <a:t>sets </a:t>
-            </a:r>
-            <a:r>
-              <a:rPr lang="en-GB" dirty="0" smtClean="0">
-                <a:solidFill>
-                  <a:schemeClr val="tx1"/>
-                </a:solidFill>
-              </a:rPr>
-              <a:t>obtained through MAMI queries with </a:t>
-            </a:r>
-            <a:r>
-              <a:rPr lang="en-GB" dirty="0" smtClean="0">
-                <a:solidFill>
-                  <a:schemeClr val="tx1"/>
-                </a:solidFill>
-              </a:rPr>
-              <a:t>other data</a:t>
+              <a:t>Anyone can (try to) combine data sets obtained through MAMI queries with other data</a:t>
             </a:r>
           </a:p>
           <a:p>

</xml_diff>